<commit_message>
reqts/glossary, supplementary, use case advanced: tweak text
</commit_message>
<xml_diff>
--- a/diagrams/requirements/useCases/details/extension.pptx
+++ b/diagrams/requirements/useCases/details/extension.pptx
@@ -104,6 +104,22 @@
       </a:defRPr>
     </a:lvl9pPr>
   </p:defaultTextStyle>
+  <p:extLst>
+    <p:ext uri="{EFAFB233-063F-42B5-8137-9DF3F51BA10A}">
+      <p15:sldGuideLst xmlns:p15="http://schemas.microsoft.com/office/powerpoint/2012/main">
+        <p15:guide id="1" orient="horz" pos="2160">
+          <p15:clr>
+            <a:srgbClr val="A4A3A4"/>
+          </p15:clr>
+        </p15:guide>
+        <p15:guide id="2" pos="2880">
+          <p15:clr>
+            <a:srgbClr val="A4A3A4"/>
+          </p15:clr>
+        </p15:guide>
+      </p15:sldGuideLst>
+    </p:ext>
+  </p:extLst>
 </p:presentation>
 </file>
 
@@ -288,7 +304,7 @@
           <a:p>
             <a:fld id="{A0F86979-30DA-49EE-A740-32EBA6D2B7DE}" type="datetimeFigureOut">
               <a:rPr lang="en-SG" smtClean="0"/>
-              <a:t>2/6/2017</a:t>
+              <a:t>13/9/2017</a:t>
             </a:fld>
             <a:endParaRPr lang="en-SG"/>
           </a:p>
@@ -458,7 +474,7 @@
           <a:p>
             <a:fld id="{A0F86979-30DA-49EE-A740-32EBA6D2B7DE}" type="datetimeFigureOut">
               <a:rPr lang="en-SG" smtClean="0"/>
-              <a:t>2/6/2017</a:t>
+              <a:t>13/9/2017</a:t>
             </a:fld>
             <a:endParaRPr lang="en-SG"/>
           </a:p>
@@ -638,7 +654,7 @@
           <a:p>
             <a:fld id="{A0F86979-30DA-49EE-A740-32EBA6D2B7DE}" type="datetimeFigureOut">
               <a:rPr lang="en-SG" smtClean="0"/>
-              <a:t>2/6/2017</a:t>
+              <a:t>13/9/2017</a:t>
             </a:fld>
             <a:endParaRPr lang="en-SG"/>
           </a:p>
@@ -808,7 +824,7 @@
           <a:p>
             <a:fld id="{A0F86979-30DA-49EE-A740-32EBA6D2B7DE}" type="datetimeFigureOut">
               <a:rPr lang="en-SG" smtClean="0"/>
-              <a:t>2/6/2017</a:t>
+              <a:t>13/9/2017</a:t>
             </a:fld>
             <a:endParaRPr lang="en-SG"/>
           </a:p>
@@ -1054,7 +1070,7 @@
           <a:p>
             <a:fld id="{A0F86979-30DA-49EE-A740-32EBA6D2B7DE}" type="datetimeFigureOut">
               <a:rPr lang="en-SG" smtClean="0"/>
-              <a:t>2/6/2017</a:t>
+              <a:t>13/9/2017</a:t>
             </a:fld>
             <a:endParaRPr lang="en-SG"/>
           </a:p>
@@ -1342,7 +1358,7 @@
           <a:p>
             <a:fld id="{A0F86979-30DA-49EE-A740-32EBA6D2B7DE}" type="datetimeFigureOut">
               <a:rPr lang="en-SG" smtClean="0"/>
-              <a:t>2/6/2017</a:t>
+              <a:t>13/9/2017</a:t>
             </a:fld>
             <a:endParaRPr lang="en-SG"/>
           </a:p>
@@ -1764,7 +1780,7 @@
           <a:p>
             <a:fld id="{A0F86979-30DA-49EE-A740-32EBA6D2B7DE}" type="datetimeFigureOut">
               <a:rPr lang="en-SG" smtClean="0"/>
-              <a:t>2/6/2017</a:t>
+              <a:t>13/9/2017</a:t>
             </a:fld>
             <a:endParaRPr lang="en-SG"/>
           </a:p>
@@ -1882,7 +1898,7 @@
           <a:p>
             <a:fld id="{A0F86979-30DA-49EE-A740-32EBA6D2B7DE}" type="datetimeFigureOut">
               <a:rPr lang="en-SG" smtClean="0"/>
-              <a:t>2/6/2017</a:t>
+              <a:t>13/9/2017</a:t>
             </a:fld>
             <a:endParaRPr lang="en-SG"/>
           </a:p>
@@ -1977,7 +1993,7 @@
           <a:p>
             <a:fld id="{A0F86979-30DA-49EE-A740-32EBA6D2B7DE}" type="datetimeFigureOut">
               <a:rPr lang="en-SG" smtClean="0"/>
-              <a:t>2/6/2017</a:t>
+              <a:t>13/9/2017</a:t>
             </a:fld>
             <a:endParaRPr lang="en-SG"/>
           </a:p>
@@ -2254,7 +2270,7 @@
           <a:p>
             <a:fld id="{A0F86979-30DA-49EE-A740-32EBA6D2B7DE}" type="datetimeFigureOut">
               <a:rPr lang="en-SG" smtClean="0"/>
-              <a:t>2/6/2017</a:t>
+              <a:t>13/9/2017</a:t>
             </a:fld>
             <a:endParaRPr lang="en-SG"/>
           </a:p>
@@ -2507,7 +2523,7 @@
           <a:p>
             <a:fld id="{A0F86979-30DA-49EE-A740-32EBA6D2B7DE}" type="datetimeFigureOut">
               <a:rPr lang="en-SG" smtClean="0"/>
-              <a:t>2/6/2017</a:t>
+              <a:t>13/9/2017</a:t>
             </a:fld>
             <a:endParaRPr lang="en-SG"/>
           </a:p>
@@ -2720,7 +2736,7 @@
           <a:p>
             <a:fld id="{A0F86979-30DA-49EE-A740-32EBA6D2B7DE}" type="datetimeFigureOut">
               <a:rPr lang="en-SG" smtClean="0"/>
-              <a:t>2/6/2017</a:t>
+              <a:t>13/9/2017</a:t>
             </a:fld>
             <a:endParaRPr lang="en-SG"/>
           </a:p>
@@ -4291,85 +4307,6 @@
       </p:cxnSp>
       <p:sp>
         <p:nvSpPr>
-          <p:cNvPr id="326" name="Isosceles Triangle 325"/>
-          <p:cNvSpPr/>
-          <p:nvPr/>
-        </p:nvSpPr>
-        <p:spPr>
-          <a:xfrm>
-            <a:off x="1828800" y="3043535"/>
-            <a:ext cx="228600" cy="228600"/>
-          </a:xfrm>
-          <a:prstGeom prst="triangle">
-            <a:avLst/>
-          </a:prstGeom>
-          <a:noFill/>
-          <a:ln>
-            <a:solidFill>
-              <a:schemeClr val="tx1"/>
-            </a:solidFill>
-          </a:ln>
-        </p:spPr>
-        <p:style>
-          <a:lnRef idx="1">
-            <a:schemeClr val="accent2"/>
-          </a:lnRef>
-          <a:fillRef idx="2">
-            <a:schemeClr val="accent2"/>
-          </a:fillRef>
-          <a:effectRef idx="1">
-            <a:schemeClr val="accent2"/>
-          </a:effectRef>
-          <a:fontRef idx="minor">
-            <a:schemeClr val="dk1"/>
-          </a:fontRef>
-        </p:style>
-        <p:txBody>
-          <a:bodyPr rtlCol="0" anchor="ctr"/>
-          <a:lstStyle/>
-          <a:p>
-            <a:pPr algn="ctr"/>
-            <a:endParaRPr lang="en-US"/>
-          </a:p>
-        </p:txBody>
-      </p:sp>
-      <p:cxnSp>
-        <p:nvCxnSpPr>
-          <p:cNvPr id="327" name="Straight Connector 326"/>
-          <p:cNvCxnSpPr/>
-          <p:nvPr/>
-        </p:nvCxnSpPr>
-        <p:spPr>
-          <a:xfrm rot="5400000">
-            <a:off x="1714500" y="3500735"/>
-            <a:ext cx="457200" cy="0"/>
-          </a:xfrm>
-          <a:prstGeom prst="line">
-            <a:avLst/>
-          </a:prstGeom>
-          <a:ln>
-            <a:solidFill>
-              <a:schemeClr val="tx1"/>
-            </a:solidFill>
-          </a:ln>
-        </p:spPr>
-        <p:style>
-          <a:lnRef idx="1">
-            <a:schemeClr val="accent1"/>
-          </a:lnRef>
-          <a:fillRef idx="0">
-            <a:schemeClr val="accent1"/>
-          </a:fillRef>
-          <a:effectRef idx="0">
-            <a:schemeClr val="accent1"/>
-          </a:effectRef>
-          <a:fontRef idx="minor">
-            <a:schemeClr val="tx1"/>
-          </a:fontRef>
-        </p:style>
-      </p:cxnSp>
-      <p:sp>
-        <p:nvSpPr>
           <p:cNvPr id="328" name="Oval 327"/>
           <p:cNvSpPr/>
           <p:nvPr/>
@@ -4566,7 +4503,7 @@
                                           </p:stCondLst>
                                         </p:cTn>
                                         <p:tgtEl>
-                                          <p:spTgt spid="326"/>
+                                          <p:spTgt spid="328"/>
                                         </p:tgtEl>
                                         <p:attrNameLst>
                                           <p:attrName>style.visibility</p:attrName>
@@ -4593,78 +4530,6 @@
                                           </p:stCondLst>
                                         </p:cTn>
                                         <p:tgtEl>
-                                          <p:spTgt spid="327"/>
-                                        </p:tgtEl>
-                                        <p:attrNameLst>
-                                          <p:attrName>style.visibility</p:attrName>
-                                        </p:attrNameLst>
-                                      </p:cBhvr>
-                                      <p:to>
-                                        <p:strVal val="visible"/>
-                                      </p:to>
-                                    </p:set>
-                                  </p:childTnLst>
-                                </p:cTn>
-                              </p:par>
-                            </p:childTnLst>
-                          </p:cTn>
-                        </p:par>
-                      </p:childTnLst>
-                    </p:cTn>
-                  </p:par>
-                  <p:par>
-                    <p:cTn id="9" fill="hold">
-                      <p:stCondLst>
-                        <p:cond delay="indefinite"/>
-                      </p:stCondLst>
-                      <p:childTnLst>
-                        <p:par>
-                          <p:cTn id="10" fill="hold">
-                            <p:stCondLst>
-                              <p:cond delay="0"/>
-                            </p:stCondLst>
-                            <p:childTnLst>
-                              <p:par>
-                                <p:cTn id="11" presetID="1" presetClass="entr" presetSubtype="0" fill="hold" grpId="0" nodeType="clickEffect">
-                                  <p:stCondLst>
-                                    <p:cond delay="0"/>
-                                  </p:stCondLst>
-                                  <p:childTnLst>
-                                    <p:set>
-                                      <p:cBhvr>
-                                        <p:cTn id="12" dur="1" fill="hold">
-                                          <p:stCondLst>
-                                            <p:cond delay="0"/>
-                                          </p:stCondLst>
-                                        </p:cTn>
-                                        <p:tgtEl>
-                                          <p:spTgt spid="328"/>
-                                        </p:tgtEl>
-                                        <p:attrNameLst>
-                                          <p:attrName>style.visibility</p:attrName>
-                                        </p:attrNameLst>
-                                      </p:cBhvr>
-                                      <p:to>
-                                        <p:strVal val="visible"/>
-                                      </p:to>
-                                    </p:set>
-                                  </p:childTnLst>
-                                </p:cTn>
-                              </p:par>
-                              <p:par>
-                                <p:cTn id="13" presetID="1" presetClass="entr" presetSubtype="0" fill="hold" nodeType="withEffect">
-                                  <p:stCondLst>
-                                    <p:cond delay="0"/>
-                                  </p:stCondLst>
-                                  <p:childTnLst>
-                                    <p:set>
-                                      <p:cBhvr>
-                                        <p:cTn id="14" dur="1" fill="hold">
-                                          <p:stCondLst>
-                                            <p:cond delay="0"/>
-                                          </p:stCondLst>
-                                        </p:cTn>
-                                        <p:tgtEl>
                                           <p:spTgt spid="329"/>
                                         </p:tgtEl>
                                         <p:attrNameLst>
@@ -4679,14 +4544,14 @@
                                 </p:cTn>
                               </p:par>
                               <p:par>
-                                <p:cTn id="15" presetID="1" presetClass="entr" presetSubtype="0" fill="hold" grpId="0" nodeType="withEffect">
+                                <p:cTn id="9" presetID="1" presetClass="entr" presetSubtype="0" fill="hold" grpId="0" nodeType="withEffect">
                                   <p:stCondLst>
                                     <p:cond delay="0"/>
                                   </p:stCondLst>
                                   <p:childTnLst>
                                     <p:set>
                                       <p:cBhvr>
-                                        <p:cTn id="16" dur="1" fill="hold">
+                                        <p:cTn id="10" dur="1" fill="hold">
                                           <p:stCondLst>
                                             <p:cond delay="0"/>
                                           </p:stCondLst>
@@ -4733,7 +4598,6 @@
       </p:par>
     </p:tnLst>
     <p:bldLst>
-      <p:bldP spid="326" grpId="0" animBg="1"/>
       <p:bldP spid="328" grpId="0" animBg="1"/>
       <p:bldP spid="330" grpId="0"/>
     </p:bldLst>

</xml_diff>